<commit_message>
Yet another small update.
</commit_message>
<xml_diff>
--- a/4_Spark_Production/Spark_Production.pptx
+++ b/4_Spark_Production/Spark_Production.pptx
@@ -9717,22 +9717,39 @@
         </p:nvSpPr>
         <p:spPr/>
         <p:txBody>
-          <a:bodyPr/>
+          <a:bodyPr>
+            <a:normAutofit fontScale="92500" lnSpcReduction="20000"/>
+          </a:bodyPr>
           <a:lstStyle/>
           <a:p>
+            <a:r>
+              <a:rPr lang="en-US" dirty="0"/>
+              <a:t>List of courses</a:t>
+            </a:r>
+            <a:endParaRPr lang="en-US" dirty="0">
+              <a:hlinkClick r:id="rId2"/>
+            </a:endParaRPr>
+          </a:p>
+          <a:p>
+            <a:pPr lvl="1"/>
             <a:r>
               <a:rPr lang="en-US" dirty="0">
                 <a:hlinkClick r:id="rId2"/>
               </a:rPr>
-              <a:t>https://geminisols.udemy.com/course/taming-big-data-with-spark-streaming-hands-on</a:t>
-            </a:r>
-            <a:endParaRPr lang="en-US" dirty="0"/>
+              <a:t>https://digitaldefynd.com/best-apache-spark-courses</a:t>
+            </a:r>
+            <a:endParaRPr lang="en-US" dirty="0">
+              <a:hlinkClick r:id="rId3"/>
+            </a:endParaRPr>
           </a:p>
           <a:p>
             <a:r>
               <a:rPr lang="en-US" dirty="0"/>
-              <a:t>Functional Programming in Scala Specialization:</a:t>
-            </a:r>
+              <a:t>Spark Streaming</a:t>
+            </a:r>
+            <a:endParaRPr lang="en-US" dirty="0">
+              <a:hlinkClick r:id="rId3"/>
+            </a:endParaRPr>
           </a:p>
           <a:p>
             <a:pPr lvl="1"/>
@@ -9740,6 +9757,22 @@
               <a:rPr lang="en-US" dirty="0">
                 <a:hlinkClick r:id="rId3"/>
               </a:rPr>
+              <a:t>https://geminisols.udemy.com/course/taming-big-data-with-spark-streaming-hands-on</a:t>
+            </a:r>
+            <a:endParaRPr lang="en-US" dirty="0"/>
+          </a:p>
+          <a:p>
+            <a:r>
+              <a:rPr lang="en-US" dirty="0"/>
+              <a:t>Functional Programming in Scala Specialization:</a:t>
+            </a:r>
+          </a:p>
+          <a:p>
+            <a:pPr lvl="1"/>
+            <a:r>
+              <a:rPr lang="en-US" dirty="0">
+                <a:hlinkClick r:id="rId4"/>
+              </a:rPr>
               <a:t>https://www.coursera.org/specializations/scala</a:t>
             </a:r>
             <a:endParaRPr lang="en-US" dirty="0"/>
@@ -9761,7 +9794,7 @@
             <a:pPr lvl="1"/>
             <a:r>
               <a:rPr lang="en-US" dirty="0">
-                <a:hlinkClick r:id="rId4"/>
+                <a:hlinkClick r:id="rId5"/>
               </a:rPr>
               <a:t>https://www.edx.org/course/big-data-analytics-using-spark</a:t>
             </a:r>
@@ -9920,7 +9953,7 @@
         </p:nvSpPr>
         <p:spPr>
           <a:xfrm>
-            <a:off x="343576" y="1036739"/>
+            <a:off x="406434" y="1463116"/>
             <a:ext cx="4572000" cy="523220"/>
           </a:xfrm>
           <a:prstGeom prst="rect">
@@ -12260,6 +12293,15 @@
 </file>
 
 <file path=customXml/item2.xml><?xml version="1.0" encoding="utf-8"?>
+<?mso-contentType ?>
+<FormTemplates xmlns="http://schemas.microsoft.com/sharepoint/v3/contenttype/forms">
+  <Display>DocumentLibraryForm</Display>
+  <Edit>DocumentLibraryForm</Edit>
+  <New>DocumentLibraryForm</New>
+</FormTemplates>
+</file>
+
+<file path=customXml/item3.xml><?xml version="1.0" encoding="utf-8"?>
 <ct:contentTypeSchema xmlns:ct="http://schemas.microsoft.com/office/2006/metadata/contentType" xmlns:ma="http://schemas.microsoft.com/office/2006/metadata/properties/metaAttributes" ct:_="" ma:_="" ma:contentTypeName="Document" ma:contentTypeID="0x010100172A58547029454AB19C4743817AE4E4" ma:contentTypeVersion="4" ma:contentTypeDescription="Create a new document." ma:contentTypeScope="" ma:versionID="fcb8c4a679d8ace45ceb166f3c894db4">
   <xsd:schema xmlns:xsd="http://www.w3.org/2001/XMLSchema" xmlns:xs="http://www.w3.org/2001/XMLSchema" xmlns:p="http://schemas.microsoft.com/office/2006/metadata/properties" xmlns:ns2="ec6ec6ed-b5e9-44ae-a1e4-02d3a5f2b088" xmlns:ns3="f9d38366-44fa-4455-b38c-7d58d880822d" targetNamespace="http://schemas.microsoft.com/office/2006/metadata/properties" ma:root="true" ma:fieldsID="32794913e6579e7cdd79cea120e27724" ns2:_="" ns3:_="">
     <xsd:import namespace="ec6ec6ed-b5e9-44ae-a1e4-02d3a5f2b088"/>
@@ -12424,15 +12466,6 @@
 </ct:contentTypeSchema>
 </file>
 
-<file path=customXml/item3.xml><?xml version="1.0" encoding="utf-8"?>
-<?mso-contentType ?>
-<FormTemplates xmlns="http://schemas.microsoft.com/sharepoint/v3/contenttype/forms">
-  <Display>DocumentLibraryForm</Display>
-  <Edit>DocumentLibraryForm</Edit>
-  <New>DocumentLibraryForm</New>
-</FormTemplates>
-</file>
-
 <file path=customXml/itemProps1.xml><?xml version="1.0" encoding="utf-8"?>
 <ds:datastoreItem xmlns:ds="http://schemas.openxmlformats.org/officeDocument/2006/customXml" ds:itemID="{FC42EE84-F11C-42C7-AEE1-990C959312CE}">
   <ds:schemaRefs>
@@ -12451,6 +12484,14 @@
 </file>
 
 <file path=customXml/itemProps2.xml><?xml version="1.0" encoding="utf-8"?>
+<ds:datastoreItem xmlns:ds="http://schemas.openxmlformats.org/officeDocument/2006/customXml" ds:itemID="{CF9D2C0E-8EC1-40ED-8E3B-49799F2A819F}">
+  <ds:schemaRefs>
+    <ds:schemaRef ds:uri="http://schemas.microsoft.com/sharepoint/v3/contenttype/forms"/>
+  </ds:schemaRefs>
+</ds:datastoreItem>
+</file>
+
+<file path=customXml/itemProps3.xml><?xml version="1.0" encoding="utf-8"?>
 <ds:datastoreItem xmlns:ds="http://schemas.openxmlformats.org/officeDocument/2006/customXml" ds:itemID="{30BE9370-688B-43F1-8A92-30C488D0F2F6}">
   <ds:schemaRefs>
     <ds:schemaRef ds:uri="http://schemas.microsoft.com/office/2006/metadata/contentType"/>
@@ -12467,12 +12508,4 @@
     <ds:schemaRef ds:uri="http://schemas.microsoft.com/internal/obd"/>
   </ds:schemaRefs>
 </ds:datastoreItem>
-</file>
-
-<file path=customXml/itemProps3.xml><?xml version="1.0" encoding="utf-8"?>
-<ds:datastoreItem xmlns:ds="http://schemas.openxmlformats.org/officeDocument/2006/customXml" ds:itemID="{CF9D2C0E-8EC1-40ED-8E3B-49799F2A819F}">
-  <ds:schemaRefs>
-    <ds:schemaRef ds:uri="http://schemas.microsoft.com/sharepoint/v3/contenttype/forms"/>
-  </ds:schemaRefs>
-</ds:datastoreItem>
 </file>
</xml_diff>